<commit_message>
added intro and datasets
</commit_message>
<xml_diff>
--- a/raykatz_nedg_gaudiosi/Poster.pptx
+++ b/raykatz_nedg_gaudiosi/Poster.pptx
@@ -4803,7 +4803,7 @@
         <p:spPr>
           <a:xfrm>
             <a:off x="457200" y="5583906"/>
-            <a:ext cx="11734800" cy="6961906"/>
+            <a:ext cx="11734800" cy="10015049"/>
           </a:xfrm>
           <a:prstGeom prst="rect">
             <a:avLst/>
@@ -4825,63 +4825,7 @@
           <a:p>
             <a:r>
               <a:rPr lang="en-US" sz="4000" dirty="0" smtClean="0"/>
-              <a:t>This is a </a:t>
-            </a:r>
-            <a:r>
-              <a:rPr lang="en-US" sz="4000" dirty="0" err="1" smtClean="0"/>
-              <a:t>paragaph</a:t>
-            </a:r>
-            <a:r>
-              <a:rPr lang="en-US" sz="4000" dirty="0" smtClean="0"/>
-              <a:t>, Insert words here, blah blah blah. This </a:t>
-            </a:r>
-            <a:r>
-              <a:rPr lang="en-US" sz="4000" dirty="0"/>
-              <a:t>is a </a:t>
-            </a:r>
-            <a:r>
-              <a:rPr lang="en-US" sz="4000" dirty="0" err="1"/>
-              <a:t>paragaph</a:t>
-            </a:r>
-            <a:r>
-              <a:rPr lang="en-US" sz="4000" dirty="0"/>
-              <a:t>, Insert words here, blah blah blah. This is a </a:t>
-            </a:r>
-            <a:r>
-              <a:rPr lang="en-US" sz="4000" dirty="0" err="1"/>
-              <a:t>paragaph</a:t>
-            </a:r>
-            <a:r>
-              <a:rPr lang="en-US" sz="4000" dirty="0"/>
-              <a:t>, Insert words here, </a:t>
-            </a:r>
-            <a:r>
-              <a:rPr lang="en-US" sz="4000" dirty="0" smtClean="0"/>
-              <a:t>blah </a:t>
-            </a:r>
-            <a:r>
-              <a:rPr lang="en-US" sz="4000" dirty="0"/>
-              <a:t>blah </a:t>
-            </a:r>
-            <a:r>
-              <a:rPr lang="en-US" sz="4000" dirty="0" smtClean="0"/>
-              <a:t>blah. This </a:t>
-            </a:r>
-            <a:r>
-              <a:rPr lang="en-US" sz="4000" dirty="0"/>
-              <a:t>is a </a:t>
-            </a:r>
-            <a:r>
-              <a:rPr lang="en-US" sz="4000" dirty="0" err="1"/>
-              <a:t>paragaph</a:t>
-            </a:r>
-            <a:r>
-              <a:rPr lang="en-US" sz="4000" dirty="0"/>
-              <a:t>, Insert words </a:t>
-            </a:r>
-            <a:r>
-              <a:rPr lang="en-US" sz="4000" dirty="0" smtClean="0"/>
-              <a:t>here.</a:t>
+              <a:t>In urban areas, gentrification is one of the most significant problem affecting low income communities. New buildings are put up, rent increases, and all of a sudden residents can no longer afford to live in the place they once called home. Our project analyzes the risk this phenomenon in Boston’s many neighborhoods by looking at various demographic, income, and housing statistics. </a:t>
             </a:r>
             <a:endParaRPr lang="en-US" sz="4000" dirty="0"/>
           </a:p>
@@ -5091,8 +5035,8 @@
         </p:nvSpPr>
         <p:spPr>
           <a:xfrm>
-            <a:off x="457200" y="13156176"/>
-            <a:ext cx="11849100" cy="6198620"/>
+            <a:off x="457200" y="13533432"/>
+            <a:ext cx="11849100" cy="6961906"/>
           </a:xfrm>
           <a:prstGeom prst="rect">
             <a:avLst/>
@@ -5119,8 +5063,9 @@
             </a:pPr>
             <a:r>
               <a:rPr lang="en-US" sz="4000" dirty="0" smtClean="0"/>
-              <a:t>Boston</a:t>
-            </a:r>
+              <a:t>2010 U.S. Census</a:t>
+            </a:r>
+            <a:endParaRPr lang="en-US" sz="4000" dirty="0" smtClean="0"/>
           </a:p>
           <a:p>
             <a:pPr marL="857250" indent="-857250">
@@ -5129,8 +5074,8 @@
               <a:buChar char="•"/>
             </a:pPr>
             <a:r>
-              <a:rPr lang="en-US" sz="4000" dirty="0" err="1" smtClean="0"/>
-              <a:t>Sdfs</a:t>
+              <a:rPr lang="en-US" sz="4000" dirty="0" smtClean="0"/>
+              <a:t>2015 American Community Survey</a:t>
             </a:r>
             <a:endParaRPr lang="en-US" sz="4000" dirty="0" smtClean="0"/>
           </a:p>
@@ -5141,8 +5086,19 @@
               <a:buChar char="•"/>
             </a:pPr>
             <a:r>
-              <a:rPr lang="en-US" sz="4000" dirty="0" err="1" smtClean="0"/>
-              <a:t>Sdf</a:t>
+              <a:rPr lang="en-US" sz="4000" dirty="0" smtClean="0"/>
+              <a:t>City of Boston Data Portal</a:t>
+            </a:r>
+          </a:p>
+          <a:p>
+            <a:pPr marL="857250" indent="-857250">
+              <a:buSzPct val="100000"/>
+              <a:buFont typeface="Arial" charset="0"/>
+              <a:buChar char="•"/>
+            </a:pPr>
+            <a:r>
+              <a:rPr lang="en-US" sz="4000" dirty="0" smtClean="0"/>
+              <a:t>MBTA Routes and Stops</a:t>
             </a:r>
             <a:endParaRPr lang="en-US" sz="4000" dirty="0" smtClean="0"/>
           </a:p>
@@ -5187,11 +5143,7 @@
             <a:pPr algn="ctr"/>
             <a:r>
               <a:rPr lang="en-US" sz="6000" smtClean="0"/>
-              <a:t>Correlation </a:t>
-            </a:r>
-            <a:r>
-              <a:rPr lang="en-US" sz="6000" smtClean="0"/>
-              <a:t>Coefficients</a:t>
+              <a:t>Correlation Coefficients</a:t>
             </a:r>
             <a:endParaRPr lang="en-US" sz="6000" dirty="0" smtClean="0"/>
           </a:p>

</xml_diff>